<commit_message>
made changes in ppt
</commit_message>
<xml_diff>
--- a/Presentation.pptx
+++ b/Presentation.pptx
@@ -129,7 +129,7 @@
   </p:defaultTextStyle>
   <p:extLst>
     <p:ext uri="{EFAFB233-063F-42B5-8137-9DF3F51BA10A}">
-      <p15:sldGuideLst xmlns:p15="http://schemas.microsoft.com/office/powerpoint/2012/main">
+      <p15:sldGuideLst xmlns:p15="http://schemas.microsoft.com/office/powerpoint/2012/main" xmlns="">
         <p15:guide id="1" orient="horz" pos="2159">
           <p15:clr>
             <a:srgbClr val="A4A3A4"/>
@@ -143,7 +143,7 @@
       </p15:sldGuideLst>
     </p:ext>
     <p:ext uri="{505F2C04-C923-438B-8C0F-E0CD2BADF298}">
-      <wppc:fontMiss xmlns:wppc="http://www.wps.cn/officeDocument/PresentationCustomData" xmlns="" type="true"/>
+      <wppc:fontMiss xmlns="" xmlns:wppc="http://www.wps.cn/officeDocument/PresentationCustomData" type="true"/>
     </p:ext>
   </p:extLst>
 </p:presentation>
@@ -571,7 +571,7 @@
           <a:p>
             <a:fld id="{331BC348-3A94-43F4-B179-C0098E7697A0}" type="datetimeFigureOut">
               <a:rPr lang="en-GB" smtClean="0"/>
-              <a:t>28/02/2020</a:t>
+              <a:t>11/04/2020</a:t>
             </a:fld>
             <a:endParaRPr lang="en-GB"/>
           </a:p>
@@ -783,7 +783,7 @@
           <a:p>
             <a:fld id="{331BC348-3A94-43F4-B179-C0098E7697A0}" type="datetimeFigureOut">
               <a:rPr lang="en-GB" smtClean="0"/>
-              <a:t>28/02/2020</a:t>
+              <a:t>11/04/2020</a:t>
             </a:fld>
             <a:endParaRPr lang="en-GB"/>
           </a:p>
@@ -970,7 +970,7 @@
           <a:p>
             <a:fld id="{331BC348-3A94-43F4-B179-C0098E7697A0}" type="datetimeFigureOut">
               <a:rPr lang="en-GB" smtClean="0"/>
-              <a:t>28/02/2020</a:t>
+              <a:t>11/04/2020</a:t>
             </a:fld>
             <a:endParaRPr lang="en-GB"/>
           </a:p>
@@ -1067,7 +1067,7 @@
           <a:p>
             <a:fld id="{331BC348-3A94-43F4-B179-C0098E7697A0}" type="datetimeFigureOut">
               <a:rPr lang="en-GB" smtClean="0"/>
-              <a:t>28/02/2020</a:t>
+              <a:t>11/04/2020</a:t>
             </a:fld>
             <a:endParaRPr lang="en-GB"/>
           </a:p>
@@ -1663,7 +1663,7 @@
           <a:p>
             <a:fld id="{331BC348-3A94-43F4-B179-C0098E7697A0}" type="datetimeFigureOut">
               <a:rPr lang="en-GB" smtClean="0"/>
-              <a:t>28/02/2020</a:t>
+              <a:t>11/04/2020</a:t>
             </a:fld>
             <a:endParaRPr lang="en-GB"/>
           </a:p>
@@ -1760,7 +1760,7 @@
           <a:p>
             <a:fld id="{331BC348-3A94-43F4-B179-C0098E7697A0}" type="datetimeFigureOut">
               <a:rPr lang="en-GB" smtClean="0"/>
-              <a:t>28/02/2020</a:t>
+              <a:t>11/04/2020</a:t>
             </a:fld>
             <a:endParaRPr lang="en-GB"/>
           </a:p>
@@ -2365,7 +2365,7 @@
           <a:p>
             <a:fld id="{331BC348-3A94-43F4-B179-C0098E7697A0}" type="datetimeFigureOut">
               <a:rPr lang="en-GB" smtClean="0"/>
-              <a:t>28/02/2020</a:t>
+              <a:t>11/04/2020</a:t>
             </a:fld>
             <a:endParaRPr lang="en-GB"/>
           </a:p>
@@ -2508,7 +2508,7 @@
           <a:p>
             <a:fld id="{331BC348-3A94-43F4-B179-C0098E7697A0}" type="datetimeFigureOut">
               <a:rPr lang="en-GB" smtClean="0"/>
-              <a:t>28/02/2020</a:t>
+              <a:t>11/04/2020</a:t>
             </a:fld>
             <a:endParaRPr lang="en-GB"/>
           </a:p>
@@ -2605,7 +2605,7 @@
           <a:p>
             <a:fld id="{331BC348-3A94-43F4-B179-C0098E7697A0}" type="datetimeFigureOut">
               <a:rPr lang="en-GB" smtClean="0"/>
-              <a:t>28/02/2020</a:t>
+              <a:t>11/04/2020</a:t>
             </a:fld>
             <a:endParaRPr lang="en-GB"/>
           </a:p>
@@ -2889,7 +2889,7 @@
           <a:p>
             <a:fld id="{331BC348-3A94-43F4-B179-C0098E7697A0}" type="datetimeFigureOut">
               <a:rPr lang="en-GB" smtClean="0"/>
-              <a:t>28/02/2020</a:t>
+              <a:t>11/04/2020</a:t>
             </a:fld>
             <a:endParaRPr lang="en-GB"/>
           </a:p>
@@ -3411,7 +3411,7 @@
           <a:p>
             <a:fld id="{331BC348-3A94-43F4-B179-C0098E7697A0}" type="datetimeFigureOut">
               <a:rPr lang="en-GB" smtClean="0"/>
-              <a:t>28/02/2020</a:t>
+              <a:t>11/04/2020</a:t>
             </a:fld>
             <a:endParaRPr lang="en-GB"/>
           </a:p>
@@ -3931,7 +3931,7 @@
           <a:p>
             <a:fld id="{331BC348-3A94-43F4-B179-C0098E7697A0}" type="datetimeFigureOut">
               <a:rPr lang="en-GB" smtClean="0"/>
-              <a:t>28/02/2020</a:t>
+              <a:t>11/04/2020</a:t>
             </a:fld>
             <a:endParaRPr lang="en-GB"/>
           </a:p>
@@ -4611,58 +4611,7 @@
                 <a:latin typeface="Calibri" panose="020F0502020204030204" pitchFamily="34" charset="0"/>
                 <a:cs typeface="Calibri" panose="020F0502020204030204" pitchFamily="34" charset="0"/>
               </a:rPr>
-              <a:t>MOTION </a:t>
-            </a:r>
-            <a:r>
-              <a:rPr lang="en-GB" sz="4000" dirty="0" smtClean="0">
-                <a:ln w="18415" cmpd="sng">
-                  <a:solidFill>
-                    <a:srgbClr val="FFFFFF"/>
-                  </a:solidFill>
-                  <a:prstDash val="solid"/>
-                </a:ln>
-                <a:solidFill>
-                  <a:schemeClr val="tx1"/>
-                </a:solidFill>
-                <a:effectLst/>
-                <a:latin typeface="Calibri" panose="020F0502020204030204" pitchFamily="34" charset="0"/>
-                <a:cs typeface="Calibri" panose="020F0502020204030204" pitchFamily="34" charset="0"/>
-              </a:rPr>
-              <a:t>CAPTURE </a:t>
-            </a:r>
-            <a:r>
-              <a:rPr lang="en-GB" sz="4000" dirty="0" smtClean="0">
-                <a:ln w="18415" cmpd="sng">
-                  <a:solidFill>
-                    <a:srgbClr val="FFFFFF"/>
-                  </a:solidFill>
-                  <a:prstDash val="solid"/>
-                </a:ln>
-                <a:solidFill>
-                  <a:schemeClr val="tx1"/>
-                </a:solidFill>
-                <a:effectLst/>
-                <a:latin typeface="Calibri" panose="020F0502020204030204" pitchFamily="34" charset="0"/>
-                <a:cs typeface="Calibri" panose="020F0502020204030204" pitchFamily="34" charset="0"/>
-              </a:rPr>
-              <a:t>HAND </a:t>
-            </a:r>
-            <a:r>
-              <a:rPr lang="en-GB" sz="4000" dirty="0" smtClean="0">
-                <a:ln w="18415" cmpd="sng">
-                  <a:solidFill>
-                    <a:srgbClr val="FFFFFF"/>
-                  </a:solidFill>
-                  <a:prstDash val="solid"/>
-                </a:ln>
-                <a:solidFill>
-                  <a:schemeClr val="tx1"/>
-                </a:solidFill>
-                <a:effectLst/>
-                <a:latin typeface="Calibri" panose="020F0502020204030204" pitchFamily="34" charset="0"/>
-                <a:cs typeface="Calibri" panose="020F0502020204030204" pitchFamily="34" charset="0"/>
-              </a:rPr>
-              <a:t>POSTURE</a:t>
+              <a:t>MOTION CAPTURE HAND POSTURE</a:t>
             </a:r>
             <a:endParaRPr lang="en-GB" sz="4000" dirty="0">
               <a:ln w="18415" cmpd="sng">
@@ -4688,7 +4637,7 @@
           <p:nvPr>
             <p:extLst>
               <p:ext uri="{D42A27DB-BD31-4B8C-83A1-F6EECF244321}">
-                <p14:modId xmlns:p14="http://schemas.microsoft.com/office/powerpoint/2010/main" val="1404387524"/>
+                <p14:modId xmlns:p14="http://schemas.microsoft.com/office/powerpoint/2010/main" val="4199539510"/>
               </p:ext>
             </p:extLst>
           </p:nvPr>
@@ -4707,21 +4656,21 @@
                 <a:gridCol w="2326640">
                   <a:extLst>
                     <a:ext uri="{9D8B030D-6E8A-4147-A177-3AD203B41FA5}">
-                      <a16:colId xmlns:a16="http://schemas.microsoft.com/office/drawing/2014/main" val="20000"/>
+                      <a16:colId xmlns:a16="http://schemas.microsoft.com/office/drawing/2014/main" xmlns="" val="20000"/>
                     </a:ext>
                   </a:extLst>
                 </a:gridCol>
                 <a:gridCol w="2326640">
                   <a:extLst>
                     <a:ext uri="{9D8B030D-6E8A-4147-A177-3AD203B41FA5}">
-                      <a16:colId xmlns:a16="http://schemas.microsoft.com/office/drawing/2014/main" val="20001"/>
+                      <a16:colId xmlns:a16="http://schemas.microsoft.com/office/drawing/2014/main" xmlns="" val="20001"/>
                     </a:ext>
                   </a:extLst>
                 </a:gridCol>
                 <a:gridCol w="2326640">
                   <a:extLst>
                     <a:ext uri="{9D8B030D-6E8A-4147-A177-3AD203B41FA5}">
-                      <a16:colId xmlns:a16="http://schemas.microsoft.com/office/drawing/2014/main" val="20002"/>
+                      <a16:colId xmlns:a16="http://schemas.microsoft.com/office/drawing/2014/main" xmlns="" val="20002"/>
                     </a:ext>
                   </a:extLst>
                 </a:gridCol>
@@ -4853,7 +4802,7 @@
                 </a:tc>
                 <a:extLst>
                   <a:ext uri="{0D108BD9-81ED-4DB2-BD59-A6C34878D82A}">
-                    <a16:rowId xmlns:a16="http://schemas.microsoft.com/office/drawing/2014/main" val="10000"/>
+                    <a16:rowId xmlns:a16="http://schemas.microsoft.com/office/drawing/2014/main" xmlns="" val="10000"/>
                   </a:ext>
                 </a:extLst>
               </a:tr>
@@ -4867,7 +4816,7 @@
                         <a:buNone/>
                       </a:pPr>
                       <a:r>
-                        <a:rPr lang="en-IN" altLang="en-GB" sz="1800" dirty="0" err="1">
+                        <a:rPr lang="en-IN" altLang="en-GB" sz="1800" err="1">
                           <a:solidFill>
                             <a:schemeClr val="tx1"/>
                           </a:solidFill>
@@ -4875,7 +4824,18 @@
                           <a:cs typeface="Calibri" panose="020F0502020204030204" pitchFamily="34" charset="0"/>
                           <a:sym typeface="+mn-ea"/>
                         </a:rPr>
-                        <a:t>Manish Khapre</a:t>
+                        <a:t>Manish </a:t>
+                      </a:r>
+                      <a:r>
+                        <a:rPr lang="en-IN" altLang="en-GB" sz="1800" smtClean="0">
+                          <a:solidFill>
+                            <a:schemeClr val="tx1"/>
+                          </a:solidFill>
+                          <a:latin typeface="Calibri" panose="020F0502020204030204" pitchFamily="34" charset="0"/>
+                          <a:cs typeface="Calibri" panose="020F0502020204030204" pitchFamily="34" charset="0"/>
+                          <a:sym typeface="+mn-ea"/>
+                        </a:rPr>
+                        <a:t>Khapre </a:t>
                       </a:r>
                       <a:endParaRPr lang="en-IN" altLang="en-GB" sz="1800" b="0" dirty="0" err="1">
                         <a:solidFill>
@@ -4889,7 +4849,7 @@
                       <a:pPr>
                         <a:buNone/>
                       </a:pPr>
-                      <a:endParaRPr lang="en-US"/>
+                      <a:endParaRPr lang="en-US" dirty="0"/>
                     </a:p>
                   </a:txBody>
                   <a:tcPr>
@@ -4967,7 +4927,7 @@
                 </a:tc>
                 <a:extLst>
                   <a:ext uri="{0D108BD9-81ED-4DB2-BD59-A6C34878D82A}">
-                    <a16:rowId xmlns:a16="http://schemas.microsoft.com/office/drawing/2014/main" val="10001"/>
+                    <a16:rowId xmlns:a16="http://schemas.microsoft.com/office/drawing/2014/main" xmlns="" val="10001"/>
                   </a:ext>
                 </a:extLst>
               </a:tr>
@@ -5140,17 +5100,7 @@
                 <a:latin typeface="Calibri" panose="020F0502020204030204" pitchFamily="34" charset="0"/>
                 <a:cs typeface="Calibri" panose="020F0502020204030204" pitchFamily="34" charset="0"/>
               </a:rPr>
-              <a:t>The </a:t>
-            </a:r>
-            <a:r>
-              <a:rPr lang="en-US" dirty="0" smtClean="0">
-                <a:solidFill>
-                  <a:schemeClr val="tx1"/>
-                </a:solidFill>
-                <a:latin typeface="Calibri" panose="020F0502020204030204" pitchFamily="34" charset="0"/>
-                <a:cs typeface="Calibri" panose="020F0502020204030204" pitchFamily="34" charset="0"/>
-              </a:rPr>
-              <a:t>starting 2 attributes are </a:t>
+              <a:t>The starting 2 attributes are </a:t>
             </a:r>
             <a:r>
               <a:rPr lang="en-US" dirty="0">
@@ -7585,42 +7535,42 @@
                 <a:gridCol w="699135">
                   <a:extLst>
                     <a:ext uri="{9D8B030D-6E8A-4147-A177-3AD203B41FA5}">
-                      <a16:colId xmlns:a16="http://schemas.microsoft.com/office/drawing/2014/main" val="20000"/>
+                      <a16:colId xmlns:a16="http://schemas.microsoft.com/office/drawing/2014/main" xmlns="" val="20000"/>
                     </a:ext>
                   </a:extLst>
                 </a:gridCol>
                 <a:gridCol w="1878330">
                   <a:extLst>
                     <a:ext uri="{9D8B030D-6E8A-4147-A177-3AD203B41FA5}">
-                      <a16:colId xmlns:a16="http://schemas.microsoft.com/office/drawing/2014/main" val="20001"/>
+                      <a16:colId xmlns:a16="http://schemas.microsoft.com/office/drawing/2014/main" xmlns="" val="20001"/>
                     </a:ext>
                   </a:extLst>
                 </a:gridCol>
                 <a:gridCol w="1270000">
                   <a:extLst>
                     <a:ext uri="{9D8B030D-6E8A-4147-A177-3AD203B41FA5}">
-                      <a16:colId xmlns:a16="http://schemas.microsoft.com/office/drawing/2014/main" val="20002"/>
+                      <a16:colId xmlns:a16="http://schemas.microsoft.com/office/drawing/2014/main" xmlns="" val="20002"/>
                     </a:ext>
                   </a:extLst>
                 </a:gridCol>
                 <a:gridCol w="1506220">
                   <a:extLst>
                     <a:ext uri="{9D8B030D-6E8A-4147-A177-3AD203B41FA5}">
-                      <a16:colId xmlns:a16="http://schemas.microsoft.com/office/drawing/2014/main" val="20003"/>
+                      <a16:colId xmlns:a16="http://schemas.microsoft.com/office/drawing/2014/main" xmlns="" val="20003"/>
                     </a:ext>
                   </a:extLst>
                 </a:gridCol>
                 <a:gridCol w="1277620">
                   <a:extLst>
                     <a:ext uri="{9D8B030D-6E8A-4147-A177-3AD203B41FA5}">
-                      <a16:colId xmlns:a16="http://schemas.microsoft.com/office/drawing/2014/main" val="20004"/>
+                      <a16:colId xmlns:a16="http://schemas.microsoft.com/office/drawing/2014/main" xmlns="" val="20004"/>
                     </a:ext>
                   </a:extLst>
                 </a:gridCol>
                 <a:gridCol w="1577607">
                   <a:extLst>
                     <a:ext uri="{9D8B030D-6E8A-4147-A177-3AD203B41FA5}">
-                      <a16:colId xmlns:a16="http://schemas.microsoft.com/office/drawing/2014/main" val="20005"/>
+                      <a16:colId xmlns:a16="http://schemas.microsoft.com/office/drawing/2014/main" xmlns="" val="20005"/>
                     </a:ext>
                   </a:extLst>
                 </a:gridCol>
@@ -7869,7 +7819,7 @@
                 </a:tc>
                 <a:extLst>
                   <a:ext uri="{0D108BD9-81ED-4DB2-BD59-A6C34878D82A}">
-                    <a16:rowId xmlns:a16="http://schemas.microsoft.com/office/drawing/2014/main" val="10000"/>
+                    <a16:rowId xmlns:a16="http://schemas.microsoft.com/office/drawing/2014/main" xmlns="" val="10000"/>
                   </a:ext>
                 </a:extLst>
               </a:tr>
@@ -8035,7 +7985,7 @@
                 </a:tc>
                 <a:extLst>
                   <a:ext uri="{0D108BD9-81ED-4DB2-BD59-A6C34878D82A}">
-                    <a16:rowId xmlns:a16="http://schemas.microsoft.com/office/drawing/2014/main" val="10001"/>
+                    <a16:rowId xmlns:a16="http://schemas.microsoft.com/office/drawing/2014/main" xmlns="" val="10001"/>
                   </a:ext>
                 </a:extLst>
               </a:tr>
@@ -8188,7 +8138,7 @@
                 </a:tc>
                 <a:extLst>
                   <a:ext uri="{0D108BD9-81ED-4DB2-BD59-A6C34878D82A}">
-                    <a16:rowId xmlns:a16="http://schemas.microsoft.com/office/drawing/2014/main" val="10002"/>
+                    <a16:rowId xmlns:a16="http://schemas.microsoft.com/office/drawing/2014/main" xmlns="" val="10002"/>
                   </a:ext>
                 </a:extLst>
               </a:tr>
@@ -8341,7 +8291,7 @@
                 </a:tc>
                 <a:extLst>
                   <a:ext uri="{0D108BD9-81ED-4DB2-BD59-A6C34878D82A}">
-                    <a16:rowId xmlns:a16="http://schemas.microsoft.com/office/drawing/2014/main" val="10003"/>
+                    <a16:rowId xmlns:a16="http://schemas.microsoft.com/office/drawing/2014/main" xmlns="" val="10003"/>
                   </a:ext>
                 </a:extLst>
               </a:tr>
@@ -8494,7 +8444,7 @@
                 </a:tc>
                 <a:extLst>
                   <a:ext uri="{0D108BD9-81ED-4DB2-BD59-A6C34878D82A}">
-                    <a16:rowId xmlns:a16="http://schemas.microsoft.com/office/drawing/2014/main" val="10004"/>
+                    <a16:rowId xmlns:a16="http://schemas.microsoft.com/office/drawing/2014/main" xmlns="" val="10004"/>
                   </a:ext>
                 </a:extLst>
               </a:tr>
@@ -12299,7 +12249,7 @@
   <a:extraClrSchemeLst/>
   <a:extLst>
     <a:ext uri="{05A4C25C-085E-4340-85A3-A5531E510DB2}">
-      <thm15:themeFamily xmlns:thm15="http://schemas.microsoft.com/office/thememl/2012/main" name="Office Theme" id="{62F939B6-93AF-4DB8-9C6B-D6C7DFDC589F}" vid="{4A3C46E8-61CC-4603-A589-7422A47A8E4A}"/>
+      <thm15:themeFamily xmlns:thm15="http://schemas.microsoft.com/office/thememl/2012/main" xmlns="" name="Office Theme" id="{62F939B6-93AF-4DB8-9C6B-D6C7DFDC589F}" vid="{4A3C46E8-61CC-4603-A589-7422A47A8E4A}"/>
     </a:ext>
   </a:extLst>
 </a:theme>

</xml_diff>